<commit_message>
REFACTOR: java0308 - ppt0308 - P13
</commit_message>
<xml_diff>
--- a/과제/과제ppt/과제4일차.pptx
+++ b/과제/과제ppt/과제4일차.pptx
@@ -1336,7 +1336,7 @@
             <a:fld id="{9334D819-9F07-4261-B09B-9E467E5D9002}" type="datetimeFigureOut">
               <a:rPr lang="en-US" dirty="0"/>
               <a:pPr/>
-              <a:t>3/17/2023</a:t>
+              <a:t>4/5/2023</a:t>
             </a:fld>
             <a:endParaRPr lang="en-US" dirty="0"/>
           </a:p>
@@ -1570,7 +1570,7 @@
           <a:p>
             <a:fld id="{9334D819-9F07-4261-B09B-9E467E5D9002}" type="datetimeFigureOut">
               <a:rPr lang="en-US" dirty="0"/>
-              <a:t>3/17/2023</a:t>
+              <a:t>4/5/2023</a:t>
             </a:fld>
             <a:endParaRPr lang="en-US" dirty="0"/>
           </a:p>
@@ -1745,7 +1745,7 @@
           <a:p>
             <a:fld id="{9334D819-9F07-4261-B09B-9E467E5D9002}" type="datetimeFigureOut">
               <a:rPr lang="en-US" dirty="0"/>
-              <a:t>3/17/2023</a:t>
+              <a:t>4/5/2023</a:t>
             </a:fld>
             <a:endParaRPr lang="en-US" dirty="0"/>
           </a:p>
@@ -1910,7 +1910,7 @@
           <a:p>
             <a:fld id="{9334D819-9F07-4261-B09B-9E467E5D9002}" type="datetimeFigureOut">
               <a:rPr lang="en-US" dirty="0"/>
-              <a:t>3/17/2023</a:t>
+              <a:t>4/5/2023</a:t>
             </a:fld>
             <a:endParaRPr lang="en-US" dirty="0"/>
           </a:p>
@@ -2182,7 +2182,7 @@
             <a:fld id="{9334D819-9F07-4261-B09B-9E467E5D9002}" type="datetimeFigureOut">
               <a:rPr lang="en-US" dirty="0"/>
               <a:pPr/>
-              <a:t>3/17/2023</a:t>
+              <a:t>4/5/2023</a:t>
             </a:fld>
             <a:endParaRPr lang="en-US" dirty="0"/>
           </a:p>
@@ -3379,7 +3379,7 @@
           <a:p>
             <a:fld id="{9334D819-9F07-4261-B09B-9E467E5D9002}" type="datetimeFigureOut">
               <a:rPr lang="en-US" dirty="0"/>
-              <a:t>3/17/2023</a:t>
+              <a:t>4/5/2023</a:t>
             </a:fld>
             <a:endParaRPr lang="en-US" dirty="0"/>
           </a:p>
@@ -3764,7 +3764,7 @@
           <a:p>
             <a:fld id="{9334D819-9F07-4261-B09B-9E467E5D9002}" type="datetimeFigureOut">
               <a:rPr lang="en-US" dirty="0"/>
-              <a:t>3/17/2023</a:t>
+              <a:t>4/5/2023</a:t>
             </a:fld>
             <a:endParaRPr lang="en-US" dirty="0"/>
           </a:p>
@@ -3882,7 +3882,7 @@
           <a:p>
             <a:fld id="{9334D819-9F07-4261-B09B-9E467E5D9002}" type="datetimeFigureOut">
               <a:rPr lang="en-US" dirty="0"/>
-              <a:t>3/17/2023</a:t>
+              <a:t>4/5/2023</a:t>
             </a:fld>
             <a:endParaRPr lang="en-US" dirty="0"/>
           </a:p>
@@ -3972,7 +3972,7 @@
           <a:p>
             <a:fld id="{9334D819-9F07-4261-B09B-9E467E5D9002}" type="datetimeFigureOut">
               <a:rPr lang="en-US" dirty="0"/>
-              <a:t>3/17/2023</a:t>
+              <a:t>4/5/2023</a:t>
             </a:fld>
             <a:endParaRPr lang="en-US" dirty="0"/>
           </a:p>
@@ -4730,7 +4730,7 @@
           <a:p>
             <a:fld id="{9334D819-9F07-4261-B09B-9E467E5D9002}" type="datetimeFigureOut">
               <a:rPr lang="en-US" dirty="0"/>
-              <a:t>3/17/2023</a:t>
+              <a:t>4/5/2023</a:t>
             </a:fld>
             <a:endParaRPr lang="en-US" dirty="0"/>
           </a:p>
@@ -5565,7 +5565,7 @@
           <a:p>
             <a:fld id="{9334D819-9F07-4261-B09B-9E467E5D9002}" type="datetimeFigureOut">
               <a:rPr lang="en-US" dirty="0"/>
-              <a:t>3/17/2023</a:t>
+              <a:t>4/5/2023</a:t>
             </a:fld>
             <a:endParaRPr lang="en-US" dirty="0"/>
           </a:p>
@@ -5788,7 +5788,7 @@
             <a:fld id="{9334D819-9F07-4261-B09B-9E467E5D9002}" type="datetimeFigureOut">
               <a:rPr lang="en-US" dirty="0"/>
               <a:pPr/>
-              <a:t>3/17/2023</a:t>
+              <a:t>4/5/2023</a:t>
             </a:fld>
             <a:endParaRPr lang="en-US" dirty="0"/>
           </a:p>
@@ -10051,7 +10051,7 @@
       </p:sp>
       <p:pic>
         <p:nvPicPr>
-          <p:cNvPr id="5" name="그림 4"/>
+          <p:cNvPr id="7" name="그림 6"/>
           <p:cNvPicPr>
             <a:picLocks noChangeAspect="1"/>
           </p:cNvPicPr>
@@ -10065,8 +10065,8 @@
         </p:blipFill>
         <p:spPr>
           <a:xfrm>
-            <a:off x="283464" y="-3139"/>
-            <a:ext cx="7453307" cy="4026499"/>
+            <a:off x="283462" y="0"/>
+            <a:ext cx="6780725" cy="5006330"/>
           </a:xfrm>
           <a:prstGeom prst="rect">
             <a:avLst/>
@@ -10075,7 +10075,7 @@
       </p:pic>
       <p:pic>
         <p:nvPicPr>
-          <p:cNvPr id="6" name="그림 5"/>
+          <p:cNvPr id="8" name="그림 7"/>
           <p:cNvPicPr>
             <a:picLocks noChangeAspect="1"/>
           </p:cNvPicPr>
@@ -10089,8 +10089,8 @@
         </p:blipFill>
         <p:spPr>
           <a:xfrm>
-            <a:off x="283464" y="3983150"/>
-            <a:ext cx="7418846" cy="2166189"/>
+            <a:off x="283461" y="5006330"/>
+            <a:ext cx="6429371" cy="1554490"/>
           </a:xfrm>
           <a:prstGeom prst="rect">
             <a:avLst/>
@@ -10127,33 +10127,6 @@
           <a:chExt cx="0" cy="0"/>
         </a:xfrm>
       </p:grpSpPr>
-      <p:pic>
-        <p:nvPicPr>
-          <p:cNvPr id="7" name="그림 개체 틀 6"/>
-          <p:cNvPicPr>
-            <a:picLocks noGrp="1" noChangeAspect="1"/>
-          </p:cNvPicPr>
-          <p:nvPr>
-            <p:ph type="pic" idx="1"/>
-          </p:nvPr>
-        </p:nvPicPr>
-        <p:blipFill>
-          <a:blip r:embed="rId2"/>
-          <a:srcRect t="1191" b="1191"/>
-          <a:stretch>
-            <a:fillRect/>
-          </a:stretch>
-        </p:blipFill>
-        <p:spPr>
-          <a:xfrm>
-            <a:off x="283465" y="2"/>
-            <a:ext cx="5865875" cy="5469064"/>
-          </a:xfrm>
-          <a:prstGeom prst="rect">
-            <a:avLst/>
-          </a:prstGeom>
-        </p:spPr>
-      </p:pic>
       <p:sp>
         <p:nvSpPr>
           <p:cNvPr id="3" name="제목 2"/>
@@ -10393,7 +10366,7 @@
           <p:nvPr/>
         </p:nvPicPr>
         <p:blipFill>
-          <a:blip r:embed="rId3"/>
+          <a:blip r:embed="rId2"/>
           <a:stretch>
             <a:fillRect/>
           </a:stretch>
@@ -10402,6 +10375,30 @@
           <a:xfrm>
             <a:off x="283465" y="5314808"/>
             <a:ext cx="5865875" cy="1543192"/>
+          </a:xfrm>
+          <a:prstGeom prst="rect">
+            <a:avLst/>
+          </a:prstGeom>
+        </p:spPr>
+      </p:pic>
+      <p:pic>
+        <p:nvPicPr>
+          <p:cNvPr id="2" name="그림 1"/>
+          <p:cNvPicPr>
+            <a:picLocks noChangeAspect="1"/>
+          </p:cNvPicPr>
+          <p:nvPr/>
+        </p:nvPicPr>
+        <p:blipFill>
+          <a:blip r:embed="rId3"/>
+          <a:stretch>
+            <a:fillRect/>
+          </a:stretch>
+        </p:blipFill>
+        <p:spPr>
+          <a:xfrm>
+            <a:off x="283465" y="-17392"/>
+            <a:ext cx="6944630" cy="5332199"/>
           </a:xfrm>
           <a:prstGeom prst="rect">
             <a:avLst/>

</xml_diff>